<commit_message>
Write about how to install Pulumi into DevOps Org
</commit_message>
<xml_diff>
--- a/workshops/04-implement-immutable-infrastructure-on-azure-with-pulumi-part-II/00 - Agenda.pptx
+++ b/workshops/04-implement-immutable-infrastructure-on-azure-with-pulumi-part-II/00 - Agenda.pptx
@@ -15399,8 +15399,12 @@
               <a:buNone/>
             </a:pPr>
             <a:r>
-              <a:rPr lang="nb-NO"/>
-              <a:t>Today’s labs</a:t>
+              <a:rPr lang="nb-NO" dirty="0" err="1"/>
+              <a:t>Today’s</a:t>
+            </a:r>
+            <a:r>
+              <a:rPr lang="nb-NO" dirty="0"/>
+              <a:t> labs</a:t>
             </a:r>
             <a:endParaRPr dirty="0"/>
           </a:p>

</xml_diff>